<commit_message>
add files with new outro
</commit_message>
<xml_diff>
--- a/Tutorials/whatiswot/3-JSON/3.JSON.pptx
+++ b/Tutorials/whatiswot/3-JSON/3.JSON.pptx
@@ -5,7 +5,7 @@
     <p:sldMasterId id="2147483648" r:id="rId1"/>
   </p:sldMasterIdLst>
   <p:notesMasterIdLst>
-    <p:notesMasterId r:id="rId51"/>
+    <p:notesMasterId r:id="rId52"/>
   </p:notesMasterIdLst>
   <p:sldIdLst>
     <p:sldId id="311" r:id="rId2"/>
@@ -57,6 +57,7 @@
     <p:sldId id="359" r:id="rId48"/>
     <p:sldId id="318" r:id="rId49"/>
     <p:sldId id="315" r:id="rId50"/>
+    <p:sldId id="276" r:id="rId51"/>
   </p:sldIdLst>
   <p:sldSz cx="12192000" cy="6858000"/>
   <p:notesSz cx="6858000" cy="9144000"/>
@@ -285,7 +286,7 @@
           <a:p>
             <a:fld id="{45DADA77-5DDC-4AF4-ADA4-7274EAA582B1}" type="datetimeFigureOut">
               <a:rPr lang="en-US" smtClean="0"/>
-              <a:t>10/2/23</a:t>
+              <a:t>11/21/23</a:t>
             </a:fld>
             <a:endParaRPr lang="en-US"/>
           </a:p>
@@ -5559,6 +5560,90 @@
 </p:notes>
 </file>
 
+<file path=ppt/notesSlides/notesSlide49.xml><?xml version="1.0" encoding="utf-8"?>
+<p:notes xmlns:a="http://schemas.openxmlformats.org/drawingml/2006/main" xmlns:r="http://schemas.openxmlformats.org/officeDocument/2006/relationships" xmlns:p="http://schemas.openxmlformats.org/presentationml/2006/main">
+  <p:cSld>
+    <p:spTree>
+      <p:nvGrpSpPr>
+        <p:cNvPr id="1" name=""/>
+        <p:cNvGrpSpPr/>
+        <p:nvPr/>
+      </p:nvGrpSpPr>
+      <p:grpSpPr>
+        <a:xfrm>
+          <a:off x="0" y="0"/>
+          <a:ext cx="0" cy="0"/>
+          <a:chOff x="0" y="0"/>
+          <a:chExt cx="0" cy="0"/>
+        </a:xfrm>
+      </p:grpSpPr>
+      <p:sp>
+        <p:nvSpPr>
+          <p:cNvPr id="2" name="Slide Image Placeholder 1"/>
+          <p:cNvSpPr>
+            <a:spLocks noGrp="1" noRot="1" noChangeAspect="1"/>
+          </p:cNvSpPr>
+          <p:nvPr>
+            <p:ph type="sldImg"/>
+          </p:nvPr>
+        </p:nvSpPr>
+        <p:spPr/>
+      </p:sp>
+      <p:sp>
+        <p:nvSpPr>
+          <p:cNvPr id="3" name="Notes Placeholder 2"/>
+          <p:cNvSpPr>
+            <a:spLocks noGrp="1"/>
+          </p:cNvSpPr>
+          <p:nvPr>
+            <p:ph type="body" idx="1"/>
+          </p:nvPr>
+        </p:nvSpPr>
+        <p:spPr/>
+        <p:txBody>
+          <a:bodyPr/>
+          <a:lstStyle/>
+          <a:p>
+            <a:endParaRPr lang="tr-TR" dirty="0"/>
+          </a:p>
+        </p:txBody>
+      </p:sp>
+      <p:sp>
+        <p:nvSpPr>
+          <p:cNvPr id="4" name="Slide Number Placeholder 3"/>
+          <p:cNvSpPr>
+            <a:spLocks noGrp="1"/>
+          </p:cNvSpPr>
+          <p:nvPr>
+            <p:ph type="sldNum" sz="quarter" idx="5"/>
+          </p:nvPr>
+        </p:nvSpPr>
+        <p:spPr/>
+        <p:txBody>
+          <a:bodyPr/>
+          <a:lstStyle/>
+          <a:p>
+            <a:fld id="{838D45EA-097A-449E-8E80-C10F8140ABDB}" type="slidenum">
+              <a:rPr lang="en-US" smtClean="0"/>
+              <a:t>50</a:t>
+            </a:fld>
+            <a:endParaRPr lang="en-US"/>
+          </a:p>
+        </p:txBody>
+      </p:sp>
+    </p:spTree>
+    <p:extLst>
+      <p:ext uri="{BB962C8B-B14F-4D97-AF65-F5344CB8AC3E}">
+        <p14:creationId xmlns:p14="http://schemas.microsoft.com/office/powerpoint/2010/main" val="1820635812"/>
+      </p:ext>
+    </p:extLst>
+  </p:cSld>
+  <p:clrMapOvr>
+    <a:masterClrMapping/>
+  </p:clrMapOvr>
+</p:notes>
+</file>
+
 <file path=ppt/notesSlides/notesSlide5.xml><?xml version="1.0" encoding="utf-8"?>
 <p:notes xmlns:a="http://schemas.openxmlformats.org/drawingml/2006/main" xmlns:r="http://schemas.openxmlformats.org/officeDocument/2006/relationships" xmlns:p="http://schemas.openxmlformats.org/presentationml/2006/main">
   <p:cSld>
@@ -6141,7 +6226,7 @@
           <a:p>
             <a:fld id="{CB90B191-8485-4720-BA99-41544628E0E9}" type="datetimeFigureOut">
               <a:rPr lang="en-US" smtClean="0"/>
-              <a:t>10/2/23</a:t>
+              <a:t>11/21/23</a:t>
             </a:fld>
             <a:endParaRPr lang="en-US"/>
           </a:p>
@@ -6339,7 +6424,7 @@
           <a:p>
             <a:fld id="{CB90B191-8485-4720-BA99-41544628E0E9}" type="datetimeFigureOut">
               <a:rPr lang="en-US" smtClean="0"/>
-              <a:t>10/2/23</a:t>
+              <a:t>11/21/23</a:t>
             </a:fld>
             <a:endParaRPr lang="en-US"/>
           </a:p>
@@ -6547,7 +6632,7 @@
           <a:p>
             <a:fld id="{CB90B191-8485-4720-BA99-41544628E0E9}" type="datetimeFigureOut">
               <a:rPr lang="en-US" smtClean="0"/>
-              <a:t>10/2/23</a:t>
+              <a:t>11/21/23</a:t>
             </a:fld>
             <a:endParaRPr lang="en-US"/>
           </a:p>
@@ -6745,7 +6830,7 @@
           <a:p>
             <a:fld id="{CB90B191-8485-4720-BA99-41544628E0E9}" type="datetimeFigureOut">
               <a:rPr lang="en-US" smtClean="0"/>
-              <a:t>10/2/23</a:t>
+              <a:t>11/21/23</a:t>
             </a:fld>
             <a:endParaRPr lang="en-US"/>
           </a:p>
@@ -7020,7 +7105,7 @@
           <a:p>
             <a:fld id="{CB90B191-8485-4720-BA99-41544628E0E9}" type="datetimeFigureOut">
               <a:rPr lang="en-US" smtClean="0"/>
-              <a:t>10/2/23</a:t>
+              <a:t>11/21/23</a:t>
             </a:fld>
             <a:endParaRPr lang="en-US"/>
           </a:p>
@@ -7285,7 +7370,7 @@
           <a:p>
             <a:fld id="{CB90B191-8485-4720-BA99-41544628E0E9}" type="datetimeFigureOut">
               <a:rPr lang="en-US" smtClean="0"/>
-              <a:t>10/2/23</a:t>
+              <a:t>11/21/23</a:t>
             </a:fld>
             <a:endParaRPr lang="en-US"/>
           </a:p>
@@ -7697,7 +7782,7 @@
           <a:p>
             <a:fld id="{CB90B191-8485-4720-BA99-41544628E0E9}" type="datetimeFigureOut">
               <a:rPr lang="en-US" smtClean="0"/>
-              <a:t>10/2/23</a:t>
+              <a:t>11/21/23</a:t>
             </a:fld>
             <a:endParaRPr lang="en-US"/>
           </a:p>
@@ -7838,7 +7923,7 @@
           <a:p>
             <a:fld id="{CB90B191-8485-4720-BA99-41544628E0E9}" type="datetimeFigureOut">
               <a:rPr lang="en-US" smtClean="0"/>
-              <a:t>10/2/23</a:t>
+              <a:t>11/21/23</a:t>
             </a:fld>
             <a:endParaRPr lang="en-US"/>
           </a:p>
@@ -7951,7 +8036,7 @@
           <a:p>
             <a:fld id="{CB90B191-8485-4720-BA99-41544628E0E9}" type="datetimeFigureOut">
               <a:rPr lang="en-US" smtClean="0"/>
-              <a:t>10/2/23</a:t>
+              <a:t>11/21/23</a:t>
             </a:fld>
             <a:endParaRPr lang="en-US"/>
           </a:p>
@@ -8262,7 +8347,7 @@
           <a:p>
             <a:fld id="{CB90B191-8485-4720-BA99-41544628E0E9}" type="datetimeFigureOut">
               <a:rPr lang="en-US" smtClean="0"/>
-              <a:t>10/2/23</a:t>
+              <a:t>11/21/23</a:t>
             </a:fld>
             <a:endParaRPr lang="en-US"/>
           </a:p>
@@ -8550,7 +8635,7 @@
           <a:p>
             <a:fld id="{CB90B191-8485-4720-BA99-41544628E0E9}" type="datetimeFigureOut">
               <a:rPr lang="en-US" smtClean="0"/>
-              <a:t>10/2/23</a:t>
+              <a:t>11/21/23</a:t>
             </a:fld>
             <a:endParaRPr lang="en-US"/>
           </a:p>
@@ -8796,7 +8881,7 @@
           <a:p>
             <a:fld id="{CB90B191-8485-4720-BA99-41544628E0E9}" type="datetimeFigureOut">
               <a:rPr lang="en-US" smtClean="0"/>
-              <a:t>10/2/23</a:t>
+              <a:t>11/21/23</a:t>
             </a:fld>
             <a:endParaRPr lang="en-US"/>
           </a:p>
@@ -13026,13 +13111,13 @@
   <p:clrMapOvr>
     <a:masterClrMapping/>
   </p:clrMapOvr>
-  <mc:AlternateContent xmlns:mc="http://schemas.openxmlformats.org/markup-compatibility/2006">
-    <mc:Choice xmlns:p159="http://schemas.microsoft.com/office/powerpoint/2015/09/main" Requires="p159">
+  <mc:AlternateContent xmlns:mc="http://schemas.openxmlformats.org/markup-compatibility/2006" xmlns:p159="http://schemas.microsoft.com/office/powerpoint/2015/09/main">
+    <mc:Choice Requires="p159">
       <p:transition xmlns:p14="http://schemas.microsoft.com/office/powerpoint/2010/main" spd="slow" p14:dur="2000" advClick="0" advTm="7500">
         <p159:morph option="byObject"/>
       </p:transition>
     </mc:Choice>
-    <mc:Fallback>
+    <mc:Fallback xmlns="">
       <p:transition spd="slow" advClick="0" advTm="7500">
         <p:fade/>
       </p:transition>
@@ -35912,14 +35997,14 @@
   <p:clrMapOvr>
     <a:masterClrMapping/>
   </p:clrMapOvr>
-  <mc:AlternateContent xmlns:mc="http://schemas.openxmlformats.org/markup-compatibility/2006" xmlns:p159="http://schemas.microsoft.com/office/powerpoint/2015/09/main">
-    <mc:Choice Requires="p159">
-      <p:transition xmlns:p14="http://schemas.microsoft.com/office/powerpoint/2010/main" spd="slow" p14:dur="2000" advClick="0" advTm="8000">
+  <mc:AlternateContent xmlns:mc="http://schemas.openxmlformats.org/markup-compatibility/2006">
+    <mc:Choice xmlns:p159="http://schemas.microsoft.com/office/powerpoint/2015/09/main" Requires="p159">
+      <p:transition xmlns:p14="http://schemas.microsoft.com/office/powerpoint/2010/main" spd="slow" p14:dur="2000" advClick="0" advTm="10000">
         <p159:morph option="byObject"/>
       </p:transition>
     </mc:Choice>
-    <mc:Fallback xmlns="">
-      <p:transition spd="slow" advClick="0" advTm="8000">
+    <mc:Fallback>
+      <p:transition spd="slow" advClick="0" advTm="10000">
         <p:fade/>
       </p:transition>
     </mc:Fallback>
@@ -36317,7 +36402,7 @@
 </file>
 
 <file path=ppt/slides/slide48.xml><?xml version="1.0" encoding="utf-8"?>
-<p:sld xmlns:a="http://schemas.openxmlformats.org/drawingml/2006/main" xmlns:r="http://schemas.openxmlformats.org/officeDocument/2006/relationships" xmlns:p="http://schemas.openxmlformats.org/presentationml/2006/main">
+<p:sld xmlns:a="http://schemas.openxmlformats.org/drawingml/2006/main" xmlns:r="http://schemas.openxmlformats.org/officeDocument/2006/relationships" xmlns:p="http://schemas.openxmlformats.org/presentationml/2006/main" show="0">
   <p:cSld>
     <p:spTree>
       <p:nvGrpSpPr>
@@ -36963,11 +37048,11 @@
   <p:clrMapOvr>
     <a:masterClrMapping/>
   </p:clrMapOvr>
-  <mc:AlternateContent xmlns:mc="http://schemas.openxmlformats.org/markup-compatibility/2006" xmlns:p14="http://schemas.microsoft.com/office/powerpoint/2010/main">
-    <mc:Choice Requires="p14">
+  <mc:AlternateContent xmlns:mc="http://schemas.openxmlformats.org/markup-compatibility/2006">
+    <mc:Choice xmlns:p14="http://schemas.microsoft.com/office/powerpoint/2010/main" Requires="p14">
       <p:transition spd="slow" p14:dur="2000" advClick="0" advTm="4000"/>
     </mc:Choice>
-    <mc:Fallback xmlns="">
+    <mc:Fallback>
       <p:transition spd="slow" advClick="0" advTm="4000"/>
     </mc:Fallback>
   </mc:AlternateContent>
@@ -37166,7 +37251,7 @@
 </file>
 
 <file path=ppt/slides/slide49.xml><?xml version="1.0" encoding="utf-8"?>
-<p:sld xmlns:a="http://schemas.openxmlformats.org/drawingml/2006/main" xmlns:r="http://schemas.openxmlformats.org/officeDocument/2006/relationships" xmlns:p="http://schemas.openxmlformats.org/presentationml/2006/main">
+<p:sld xmlns:a="http://schemas.openxmlformats.org/drawingml/2006/main" xmlns:r="http://schemas.openxmlformats.org/officeDocument/2006/relationships" xmlns:p="http://schemas.openxmlformats.org/presentationml/2006/main" show="0">
   <p:cSld>
     <p:spTree>
       <p:nvGrpSpPr>
@@ -38142,6 +38227,376 @@
     </mc:Choice>
     <mc:Fallback xmlns="">
       <p:transition spd="slow" advClick="0" advTm="750">
+        <p:fade/>
+      </p:transition>
+    </mc:Fallback>
+  </mc:AlternateContent>
+</p:sld>
+</file>
+
+<file path=ppt/slides/slide50.xml><?xml version="1.0" encoding="utf-8"?>
+<p:sld xmlns:a="http://schemas.openxmlformats.org/drawingml/2006/main" xmlns:r="http://schemas.openxmlformats.org/officeDocument/2006/relationships" xmlns:p="http://schemas.openxmlformats.org/presentationml/2006/main">
+  <p:cSld>
+    <p:spTree>
+      <p:nvGrpSpPr>
+        <p:cNvPr id="1" name=""/>
+        <p:cNvGrpSpPr/>
+        <p:nvPr/>
+      </p:nvGrpSpPr>
+      <p:grpSpPr>
+        <a:xfrm>
+          <a:off x="0" y="0"/>
+          <a:ext cx="0" cy="0"/>
+          <a:chOff x="0" y="0"/>
+          <a:chExt cx="0" cy="0"/>
+        </a:xfrm>
+      </p:grpSpPr>
+      <p:sp>
+        <p:nvSpPr>
+          <p:cNvPr id="6" name="Rounded Rectangle 5">
+            <a:extLst>
+              <a:ext uri="{FF2B5EF4-FFF2-40B4-BE49-F238E27FC236}">
+                <a16:creationId xmlns:a16="http://schemas.microsoft.com/office/drawing/2014/main" id="{079D50C5-FAF9-69C9-E581-B5318807CD15}"/>
+              </a:ext>
+            </a:extLst>
+          </p:cNvPr>
+          <p:cNvSpPr/>
+          <p:nvPr/>
+        </p:nvSpPr>
+        <p:spPr>
+          <a:xfrm>
+            <a:off x="1032256" y="3291829"/>
+            <a:ext cx="4547616" cy="2818177"/>
+          </a:xfrm>
+          <a:prstGeom prst="roundRect">
+            <a:avLst>
+              <a:gd name="adj" fmla="val 8522"/>
+            </a:avLst>
+          </a:prstGeom>
+          <a:noFill/>
+          <a:ln w="57150">
+            <a:solidFill>
+              <a:schemeClr val="accent2"/>
+            </a:solidFill>
+          </a:ln>
+        </p:spPr>
+        <p:style>
+          <a:lnRef idx="2">
+            <a:schemeClr val="accent1">
+              <a:shade val="15000"/>
+            </a:schemeClr>
+          </a:lnRef>
+          <a:fillRef idx="1">
+            <a:schemeClr val="accent1"/>
+          </a:fillRef>
+          <a:effectRef idx="0">
+            <a:schemeClr val="accent1"/>
+          </a:effectRef>
+          <a:fontRef idx="minor">
+            <a:schemeClr val="lt1"/>
+          </a:fontRef>
+        </p:style>
+        <p:txBody>
+          <a:bodyPr rtlCol="0" anchor="ctr"/>
+          <a:lstStyle/>
+          <a:p>
+            <a:pPr algn="ctr"/>
+            <a:endParaRPr lang="en-US"/>
+          </a:p>
+        </p:txBody>
+      </p:sp>
+      <p:sp>
+        <p:nvSpPr>
+          <p:cNvPr id="8" name="TextBox 7">
+            <a:extLst>
+              <a:ext uri="{FF2B5EF4-FFF2-40B4-BE49-F238E27FC236}">
+                <a16:creationId xmlns:a16="http://schemas.microsoft.com/office/drawing/2014/main" id="{17B2EE81-90D0-AEF5-195E-CD3BBEC1AAC8}"/>
+              </a:ext>
+            </a:extLst>
+          </p:cNvPr>
+          <p:cNvSpPr txBox="1"/>
+          <p:nvPr/>
+        </p:nvSpPr>
+        <p:spPr>
+          <a:xfrm>
+            <a:off x="2731008" y="585216"/>
+            <a:ext cx="184731" cy="369332"/>
+          </a:xfrm>
+          <a:prstGeom prst="rect">
+            <a:avLst/>
+          </a:prstGeom>
+          <a:noFill/>
+        </p:spPr>
+        <p:txBody>
+          <a:bodyPr wrap="none" rtlCol="0">
+            <a:spAutoFit/>
+          </a:bodyPr>
+          <a:lstStyle/>
+          <a:p>
+            <a:endParaRPr lang="en-US" dirty="0"/>
+          </a:p>
+        </p:txBody>
+      </p:sp>
+      <p:sp>
+        <p:nvSpPr>
+          <p:cNvPr id="13" name="TextBox 12">
+            <a:extLst>
+              <a:ext uri="{FF2B5EF4-FFF2-40B4-BE49-F238E27FC236}">
+                <a16:creationId xmlns:a16="http://schemas.microsoft.com/office/drawing/2014/main" id="{194EC36A-72C0-5D97-08B6-18C18A96A95D}"/>
+              </a:ext>
+            </a:extLst>
+          </p:cNvPr>
+          <p:cNvSpPr txBox="1"/>
+          <p:nvPr/>
+        </p:nvSpPr>
+        <p:spPr>
+          <a:xfrm>
+            <a:off x="8769346" y="2544227"/>
+            <a:ext cx="2390398" cy="584775"/>
+          </a:xfrm>
+          <a:prstGeom prst="rect">
+            <a:avLst/>
+          </a:prstGeom>
+          <a:noFill/>
+        </p:spPr>
+        <p:txBody>
+          <a:bodyPr wrap="none" rtlCol="0">
+            <a:spAutoFit/>
+          </a:bodyPr>
+          <a:lstStyle/>
+          <a:p>
+            <a:r>
+              <a:rPr lang="en-US" sz="3200" dirty="0">
+                <a:solidFill>
+                  <a:schemeClr val="accent2"/>
+                </a:solidFill>
+                <a:latin typeface="Century Gothic" panose="020B0502020202020204" pitchFamily="34" charset="0"/>
+              </a:rPr>
+              <a:t>Next Video</a:t>
+            </a:r>
+          </a:p>
+        </p:txBody>
+      </p:sp>
+      <p:sp>
+        <p:nvSpPr>
+          <p:cNvPr id="14" name="Rectangle 13">
+            <a:extLst>
+              <a:ext uri="{FF2B5EF4-FFF2-40B4-BE49-F238E27FC236}">
+                <a16:creationId xmlns:a16="http://schemas.microsoft.com/office/drawing/2014/main" id="{30610344-5073-9351-D254-6D8408C00B10}"/>
+              </a:ext>
+            </a:extLst>
+          </p:cNvPr>
+          <p:cNvSpPr>
+            <a:spLocks/>
+          </p:cNvSpPr>
+          <p:nvPr/>
+        </p:nvSpPr>
+        <p:spPr>
+          <a:xfrm>
+            <a:off x="4507675" y="432606"/>
+            <a:ext cx="3176651" cy="3696485"/>
+          </a:xfrm>
+          <a:prstGeom prst="rect">
+            <a:avLst/>
+          </a:prstGeom>
+          <a:noFill/>
+        </p:spPr>
+        <p:txBody>
+          <a:bodyPr wrap="none" lIns="91440" tIns="45720" rIns="91440" bIns="45720">
+            <a:prstTxWarp prst="textArchUp">
+              <a:avLst>
+                <a:gd name="adj" fmla="val 11740300"/>
+              </a:avLst>
+            </a:prstTxWarp>
+            <a:spAutoFit/>
+          </a:bodyPr>
+          <a:lstStyle/>
+          <a:p>
+            <a:r>
+              <a:rPr lang="en-US" sz="3600" dirty="0">
+                <a:solidFill>
+                  <a:schemeClr val="accent1"/>
+                </a:solidFill>
+                <a:latin typeface="Century Gothic" panose="020B0502020202020204" pitchFamily="34" charset="0"/>
+              </a:rPr>
+              <a:t>Subscribe to our Channel</a:t>
+            </a:r>
+          </a:p>
+        </p:txBody>
+      </p:sp>
+      <p:sp>
+        <p:nvSpPr>
+          <p:cNvPr id="2" name="TextBox 1">
+            <a:extLst>
+              <a:ext uri="{FF2B5EF4-FFF2-40B4-BE49-F238E27FC236}">
+                <a16:creationId xmlns:a16="http://schemas.microsoft.com/office/drawing/2014/main" id="{DB648E07-0ADA-3213-F04B-B618F86FE55A}"/>
+              </a:ext>
+            </a:extLst>
+          </p:cNvPr>
+          <p:cNvSpPr txBox="1"/>
+          <p:nvPr/>
+        </p:nvSpPr>
+        <p:spPr>
+          <a:xfrm>
+            <a:off x="1032256" y="2544228"/>
+            <a:ext cx="1556836" cy="584775"/>
+          </a:xfrm>
+          <a:prstGeom prst="rect">
+            <a:avLst/>
+          </a:prstGeom>
+          <a:noFill/>
+        </p:spPr>
+        <p:txBody>
+          <a:bodyPr wrap="none" rtlCol="0">
+            <a:spAutoFit/>
+          </a:bodyPr>
+          <a:lstStyle/>
+          <a:p>
+            <a:r>
+              <a:rPr lang="en-US" sz="3200" dirty="0">
+                <a:solidFill>
+                  <a:schemeClr val="accent2"/>
+                </a:solidFill>
+                <a:latin typeface="Century Gothic" panose="020B0502020202020204" pitchFamily="34" charset="0"/>
+              </a:rPr>
+              <a:t>Playlist</a:t>
+            </a:r>
+            <a:r>
+              <a:rPr lang="en-US" sz="2400" dirty="0">
+                <a:solidFill>
+                  <a:schemeClr val="accent2"/>
+                </a:solidFill>
+                <a:latin typeface="Century Gothic" panose="020B0502020202020204" pitchFamily="34" charset="0"/>
+              </a:rPr>
+              <a:t> </a:t>
+            </a:r>
+          </a:p>
+        </p:txBody>
+      </p:sp>
+      <p:sp>
+        <p:nvSpPr>
+          <p:cNvPr id="4" name="Oval 3">
+            <a:extLst>
+              <a:ext uri="{FF2B5EF4-FFF2-40B4-BE49-F238E27FC236}">
+                <a16:creationId xmlns:a16="http://schemas.microsoft.com/office/drawing/2014/main" id="{B0419334-D010-AABC-F69E-4CE3A439194D}"/>
+              </a:ext>
+            </a:extLst>
+          </p:cNvPr>
+          <p:cNvSpPr/>
+          <p:nvPr/>
+        </p:nvSpPr>
+        <p:spPr>
+          <a:xfrm>
+            <a:off x="4899713" y="736429"/>
+            <a:ext cx="2392574" cy="2392574"/>
+          </a:xfrm>
+          <a:prstGeom prst="ellipse">
+            <a:avLst/>
+          </a:prstGeom>
+          <a:noFill/>
+          <a:ln w="57150">
+            <a:solidFill>
+              <a:schemeClr val="accent1"/>
+            </a:solidFill>
+          </a:ln>
+        </p:spPr>
+        <p:style>
+          <a:lnRef idx="2">
+            <a:schemeClr val="accent1">
+              <a:shade val="15000"/>
+            </a:schemeClr>
+          </a:lnRef>
+          <a:fillRef idx="1">
+            <a:schemeClr val="accent1"/>
+          </a:fillRef>
+          <a:effectRef idx="0">
+            <a:schemeClr val="accent1"/>
+          </a:effectRef>
+          <a:fontRef idx="minor">
+            <a:schemeClr val="lt1"/>
+          </a:fontRef>
+        </p:style>
+        <p:txBody>
+          <a:bodyPr rtlCol="0" anchor="ctr"/>
+          <a:lstStyle/>
+          <a:p>
+            <a:pPr algn="ctr"/>
+            <a:endParaRPr lang="en-US"/>
+          </a:p>
+        </p:txBody>
+      </p:sp>
+      <p:sp>
+        <p:nvSpPr>
+          <p:cNvPr id="7" name="Rounded Rectangle 6">
+            <a:extLst>
+              <a:ext uri="{FF2B5EF4-FFF2-40B4-BE49-F238E27FC236}">
+                <a16:creationId xmlns:a16="http://schemas.microsoft.com/office/drawing/2014/main" id="{17CFD8EC-DAD6-2D70-BC4C-CA8D499F942E}"/>
+              </a:ext>
+            </a:extLst>
+          </p:cNvPr>
+          <p:cNvSpPr/>
+          <p:nvPr/>
+        </p:nvSpPr>
+        <p:spPr>
+          <a:xfrm>
+            <a:off x="6612128" y="3291829"/>
+            <a:ext cx="4547616" cy="2818177"/>
+          </a:xfrm>
+          <a:prstGeom prst="roundRect">
+            <a:avLst>
+              <a:gd name="adj" fmla="val 8522"/>
+            </a:avLst>
+          </a:prstGeom>
+          <a:noFill/>
+          <a:ln w="57150">
+            <a:solidFill>
+              <a:schemeClr val="accent2"/>
+            </a:solidFill>
+          </a:ln>
+        </p:spPr>
+        <p:style>
+          <a:lnRef idx="2">
+            <a:schemeClr val="accent1">
+              <a:shade val="15000"/>
+            </a:schemeClr>
+          </a:lnRef>
+          <a:fillRef idx="1">
+            <a:schemeClr val="accent1"/>
+          </a:fillRef>
+          <a:effectRef idx="0">
+            <a:schemeClr val="accent1"/>
+          </a:effectRef>
+          <a:fontRef idx="minor">
+            <a:schemeClr val="lt1"/>
+          </a:fontRef>
+        </p:style>
+        <p:txBody>
+          <a:bodyPr rtlCol="0" anchor="ctr"/>
+          <a:lstStyle/>
+          <a:p>
+            <a:pPr algn="ctr"/>
+            <a:endParaRPr lang="en-US"/>
+          </a:p>
+        </p:txBody>
+      </p:sp>
+    </p:spTree>
+    <p:extLst>
+      <p:ext uri="{BB962C8B-B14F-4D97-AF65-F5344CB8AC3E}">
+        <p14:creationId xmlns:p14="http://schemas.microsoft.com/office/powerpoint/2010/main" val="891335981"/>
+      </p:ext>
+    </p:extLst>
+  </p:cSld>
+  <p:clrMapOvr>
+    <a:masterClrMapping/>
+  </p:clrMapOvr>
+  <mc:AlternateContent xmlns:mc="http://schemas.openxmlformats.org/markup-compatibility/2006">
+    <mc:Choice xmlns:p159="http://schemas.microsoft.com/office/powerpoint/2015/09/main" Requires="p159">
+      <p:transition xmlns:p14="http://schemas.microsoft.com/office/powerpoint/2010/main" spd="slow" p14:dur="2000" advTm="10000">
+        <p159:morph option="byObject"/>
+      </p:transition>
+    </mc:Choice>
+    <mc:Fallback>
+      <p:transition spd="slow" advTm="10000">
         <p:fade/>
       </p:transition>
     </mc:Fallback>

</xml_diff>